<commit_message>
revise cheatsheets for api changes
</commit_message>
<xml_diff>
--- a/cheatsheet/nctoolkit_cheatsheet.pptx
+++ b/cheatsheet/nctoolkit_cheatsheet.pptx
@@ -1443,7 +1443,7 @@
           </a:ln>
           <a:extLst>
             <a:ext uri="{C572A759-6A51-4108-AA02-DFA0A04FC94B}">
-              <ma14:wrappingTextBoxFlag xmlns="" xmlns:ma14="http://schemas.microsoft.com/office/mac/drawingml/2011/main" val="1"/>
+              <ma14:wrappingTextBoxFlag xmlns:ma14="http://schemas.microsoft.com/office/mac/drawingml/2011/main" xmlns="" val="1"/>
             </a:ext>
           </a:extLst>
         </p:spPr>
@@ -1486,7 +1486,7 @@
           </a:ln>
           <a:extLst>
             <a:ext uri="{C572A759-6A51-4108-AA02-DFA0A04FC94B}">
-              <ma14:wrappingTextBoxFlag xmlns="" xmlns:ma14="http://schemas.microsoft.com/office/mac/drawingml/2011/main" val="1"/>
+              <ma14:wrappingTextBoxFlag xmlns:ma14="http://schemas.microsoft.com/office/mac/drawingml/2011/main" xmlns="" val="1"/>
             </a:ext>
           </a:extLst>
         </p:spPr>
@@ -1970,7 +1970,7 @@
           </a:ln>
           <a:extLst>
             <a:ext uri="{C572A759-6A51-4108-AA02-DFA0A04FC94B}">
-              <ma14:wrappingTextBoxFlag xmlns="" xmlns:ma14="http://schemas.microsoft.com/office/mac/drawingml/2011/main" val="1"/>
+              <ma14:wrappingTextBoxFlag xmlns:ma14="http://schemas.microsoft.com/office/mac/drawingml/2011/main" xmlns="" val="1"/>
             </a:ext>
           </a:extLst>
         </p:spPr>
@@ -2365,7 +2365,7 @@
           </a:ln>
           <a:extLst>
             <a:ext uri="{C572A759-6A51-4108-AA02-DFA0A04FC94B}">
-              <ma14:wrappingTextBoxFlag xmlns="" xmlns:ma14="http://schemas.microsoft.com/office/mac/drawingml/2011/main" val="1"/>
+              <ma14:wrappingTextBoxFlag xmlns:ma14="http://schemas.microsoft.com/office/mac/drawingml/2011/main" xmlns="" val="1"/>
             </a:ext>
           </a:extLst>
         </p:spPr>
@@ -2455,20 +2455,12 @@
               <a:tabLst/>
             </a:pPr>
             <a:r>
-              <a:rPr lang="en-GB" sz="1400" b="1" dirty="0" err="1">
-                <a:solidFill>
-                  <a:srgbClr val="000000"/>
-                </a:solidFill>
-              </a:rPr>
-              <a:t>d</a:t>
-            </a:r>
-            <a:r>
               <a:rPr lang="en-GB" sz="1400" b="1" dirty="0" err="1" smtClean="0">
                 <a:solidFill>
                   <a:srgbClr val="000000"/>
                 </a:solidFill>
               </a:rPr>
-              <a:t>s.crop</a:t>
+              <a:t>ds.subset</a:t>
             </a:r>
             <a:r>
               <a:rPr lang="en-GB" sz="1400" b="1" dirty="0" smtClean="0">
@@ -2492,7 +2484,15 @@
                   <a:srgbClr val="000000"/>
                 </a:solidFill>
               </a:rPr>
-              <a:t> = [</a:t>
+              <a:t> </a:t>
+            </a:r>
+            <a:r>
+              <a:rPr lang="en-GB" sz="1400" b="1" dirty="0" smtClean="0">
+                <a:solidFill>
+                  <a:srgbClr val="000000"/>
+                </a:solidFill>
+              </a:rPr>
+              <a:t>= [</a:t>
             </a:r>
             <a:r>
               <a:rPr lang="en-GB" sz="1400" b="1" dirty="0" err="1" smtClean="0">
@@ -2715,20 +2715,12 @@
               <a:tabLst/>
             </a:pPr>
             <a:r>
-              <a:rPr lang="en-GB" sz="1400" b="1" dirty="0" err="1">
-                <a:solidFill>
-                  <a:srgbClr val="000000"/>
-                </a:solidFill>
-              </a:rPr>
-              <a:t>d</a:t>
-            </a:r>
-            <a:r>
               <a:rPr lang="en-GB" sz="1400" b="1" dirty="0" err="1" smtClean="0">
                 <a:solidFill>
                   <a:srgbClr val="000000"/>
                 </a:solidFill>
               </a:rPr>
-              <a:t>s.select</a:t>
+              <a:t>ds.subset</a:t>
             </a:r>
             <a:r>
               <a:rPr lang="en-GB" sz="1400" b="1" dirty="0" smtClean="0">
@@ -2736,7 +2728,15 @@
                   <a:srgbClr val="000000"/>
                 </a:solidFill>
               </a:rPr>
-              <a:t>(variables = [var1, var2])</a:t>
+              <a:t>(variables </a:t>
+            </a:r>
+            <a:r>
+              <a:rPr lang="en-GB" sz="1400" b="1" dirty="0" smtClean="0">
+                <a:solidFill>
+                  <a:srgbClr val="000000"/>
+                </a:solidFill>
+              </a:rPr>
+              <a:t>= [var1, var2])</a:t>
             </a:r>
           </a:p>
           <a:p>
@@ -2816,20 +2816,12 @@
           <a:p>
             <a:pPr algn="l" rtl="0" latinLnBrk="1" hangingPunct="0"/>
             <a:r>
-              <a:rPr lang="en-GB" sz="1400" b="1" dirty="0" err="1">
-                <a:solidFill>
-                  <a:srgbClr val="000000"/>
-                </a:solidFill>
-              </a:rPr>
-              <a:t>d</a:t>
-            </a:r>
-            <a:r>
               <a:rPr lang="en-GB" sz="1400" b="1" dirty="0" err="1" smtClean="0">
                 <a:solidFill>
                   <a:srgbClr val="000000"/>
                 </a:solidFill>
               </a:rPr>
-              <a:t>s.select</a:t>
+              <a:t>ds.subset</a:t>
             </a:r>
             <a:r>
               <a:rPr lang="en-GB" sz="1400" b="1" dirty="0" smtClean="0">
@@ -2837,7 +2829,15 @@
                   <a:srgbClr val="000000"/>
                 </a:solidFill>
               </a:rPr>
-              <a:t>(years = [2000, 2001])</a:t>
+              <a:t>(years </a:t>
+            </a:r>
+            <a:r>
+              <a:rPr lang="en-GB" sz="1400" b="1" dirty="0" smtClean="0">
+                <a:solidFill>
+                  <a:srgbClr val="000000"/>
+                </a:solidFill>
+              </a:rPr>
+              <a:t>= [2000, 2001])</a:t>
             </a:r>
             <a:r>
               <a:rPr lang="en-GB" sz="1400" dirty="0">
@@ -2880,7 +2880,7 @@
                   <a:srgbClr val="000000"/>
                 </a:solidFill>
               </a:rPr>
-              <a:t>ds.select</a:t>
+              <a:t>ds.subset</a:t>
             </a:r>
             <a:r>
               <a:rPr lang="en-GB" sz="1400" b="1" dirty="0" smtClean="0">
@@ -2888,7 +2888,15 @@
                   <a:srgbClr val="000000"/>
                 </a:solidFill>
               </a:rPr>
-              <a:t>(months = [5, 6])</a:t>
+              <a:t>(months </a:t>
+            </a:r>
+            <a:r>
+              <a:rPr lang="en-GB" sz="1400" b="1" dirty="0" smtClean="0">
+                <a:solidFill>
+                  <a:srgbClr val="000000"/>
+                </a:solidFill>
+              </a:rPr>
+              <a:t>= [5, 6])</a:t>
             </a:r>
             <a:r>
               <a:rPr lang="en-GB" sz="1400" dirty="0">
@@ -2921,20 +2929,12 @@
           <a:p>
             <a:pPr algn="l" rtl="0" latinLnBrk="1" hangingPunct="0"/>
             <a:r>
-              <a:rPr lang="en-GB" sz="1400" b="1" dirty="0" err="1">
-                <a:solidFill>
-                  <a:srgbClr val="000000"/>
-                </a:solidFill>
-              </a:rPr>
-              <a:t>d</a:t>
-            </a:r>
-            <a:r>
               <a:rPr lang="en-GB" sz="1400" b="1" dirty="0" err="1" smtClean="0">
                 <a:solidFill>
                   <a:srgbClr val="000000"/>
                 </a:solidFill>
               </a:rPr>
-              <a:t>s.drop</a:t>
+              <a:t>ds.drop</a:t>
             </a:r>
             <a:r>
               <a:rPr lang="en-GB" sz="1400" b="1" dirty="0" smtClean="0">
@@ -2942,7 +2942,15 @@
                   <a:srgbClr val="000000"/>
                 </a:solidFill>
               </a:rPr>
-              <a:t>([‘var1’, ‘var2])</a:t>
+              <a:t>(variables = [‘</a:t>
+            </a:r>
+            <a:r>
+              <a:rPr lang="en-GB" sz="1400" b="1" dirty="0" smtClean="0">
+                <a:solidFill>
+                  <a:srgbClr val="000000"/>
+                </a:solidFill>
+              </a:rPr>
+              <a:t>var1’, ‘var2])</a:t>
             </a:r>
           </a:p>
           <a:p>
@@ -2995,7 +3003,7 @@
           </a:ln>
           <a:extLst>
             <a:ext uri="{C572A759-6A51-4108-AA02-DFA0A04FC94B}">
-              <ma14:wrappingTextBoxFlag xmlns="" xmlns:ma14="http://schemas.microsoft.com/office/mac/drawingml/2011/main" val="1"/>
+              <ma14:wrappingTextBoxFlag xmlns:ma14="http://schemas.microsoft.com/office/mac/drawingml/2011/main" xmlns="" val="1"/>
             </a:ext>
           </a:extLst>
         </p:spPr>
@@ -3265,7 +3273,7 @@
           </a:ln>
           <a:extLst>
             <a:ext uri="{C572A759-6A51-4108-AA02-DFA0A04FC94B}">
-              <ma14:wrappingTextBoxFlag xmlns="" xmlns:ma14="http://schemas.microsoft.com/office/mac/drawingml/2011/main" val="1"/>
+              <ma14:wrappingTextBoxFlag xmlns:ma14="http://schemas.microsoft.com/office/mac/drawingml/2011/main" xmlns="" val="1"/>
             </a:ext>
           </a:extLst>
         </p:spPr>
@@ -3322,7 +3330,7 @@
           </a:ln>
           <a:extLst>
             <a:ext uri="{C572A759-6A51-4108-AA02-DFA0A04FC94B}">
-              <ma14:wrappingTextBoxFlag xmlns="" xmlns:ma14="http://schemas.microsoft.com/office/mac/drawingml/2011/main" val="1"/>
+              <ma14:wrappingTextBoxFlag xmlns:ma14="http://schemas.microsoft.com/office/mac/drawingml/2011/main" xmlns="" val="1"/>
             </a:ext>
           </a:extLst>
         </p:spPr>
@@ -4344,7 +4352,7 @@
           </a:ln>
           <a:extLst>
             <a:ext uri="{C572A759-6A51-4108-AA02-DFA0A04FC94B}">
-              <ma14:wrappingTextBoxFlag xmlns="" xmlns:ma14="http://schemas.microsoft.com/office/mac/drawingml/2011/main" val="1"/>
+              <ma14:wrappingTextBoxFlag xmlns:ma14="http://schemas.microsoft.com/office/mac/drawingml/2011/main" xmlns="" val="1"/>
             </a:ext>
           </a:extLst>
         </p:spPr>
@@ -4760,7 +4768,7 @@
           </a:ln>
           <a:extLst>
             <a:ext uri="{C572A759-6A51-4108-AA02-DFA0A04FC94B}">
-              <ma14:wrappingTextBoxFlag xmlns="" xmlns:ma14="http://schemas.microsoft.com/office/mac/drawingml/2011/main" val="1"/>
+              <ma14:wrappingTextBoxFlag xmlns:ma14="http://schemas.microsoft.com/office/mac/drawingml/2011/main" xmlns="" val="1"/>
             </a:ext>
           </a:extLst>
         </p:spPr>
@@ -5230,7 +5238,7 @@
           </a:ln>
           <a:extLst>
             <a:ext uri="{C572A759-6A51-4108-AA02-DFA0A04FC94B}">
-              <ma14:wrappingTextBoxFlag xmlns="" xmlns:ma14="http://schemas.microsoft.com/office/mac/drawingml/2011/main" val="1"/>
+              <ma14:wrappingTextBoxFlag xmlns:ma14="http://schemas.microsoft.com/office/mac/drawingml/2011/main" xmlns="" val="1"/>
             </a:ext>
           </a:extLst>
         </p:spPr>
@@ -5318,8 +5326,13 @@
                   <a:srgbClr val="000000"/>
                 </a:solidFill>
               </a:rPr>
-              <a:t>()</a:t>
-            </a:r>
+              <a:t>(“variables”)</a:t>
+            </a:r>
+            <a:endParaRPr lang="en-GB" sz="1400" b="1" dirty="0" smtClean="0">
+              <a:solidFill>
+                <a:srgbClr val="000000"/>
+              </a:solidFill>
+            </a:endParaRPr>
           </a:p>
           <a:p>
             <a:pPr algn="l" rtl="0" latinLnBrk="1" hangingPunct="0"/>
@@ -5340,7 +5353,7 @@
                   <a:srgbClr val="000000"/>
                 </a:solidFill>
               </a:rPr>
-              <a:t>ds.merge_time</a:t>
+              <a:t>ds.merge</a:t>
             </a:r>
             <a:r>
               <a:rPr lang="en-GB" sz="1400" b="1" dirty="0" smtClean="0">
@@ -5348,7 +5361,7 @@
                   <a:srgbClr val="000000"/>
                 </a:solidFill>
               </a:rPr>
-              <a:t>()</a:t>
+              <a:t>(“time”)</a:t>
             </a:r>
             <a:endParaRPr lang="en-GB" sz="1400" b="1" dirty="0">
               <a:solidFill>
@@ -5430,7 +5443,7 @@
           </a:ln>
           <a:extLst>
             <a:ext uri="{C572A759-6A51-4108-AA02-DFA0A04FC94B}">
-              <ma14:wrappingTextBoxFlag xmlns="" xmlns:ma14="http://schemas.microsoft.com/office/mac/drawingml/2011/main" val="1"/>
+              <ma14:wrappingTextBoxFlag xmlns:ma14="http://schemas.microsoft.com/office/mac/drawingml/2011/main" xmlns="" val="1"/>
             </a:ext>
           </a:extLst>
         </p:spPr>
@@ -5582,7 +5595,7 @@
           </a:ln>
           <a:extLst>
             <a:ext uri="{C572A759-6A51-4108-AA02-DFA0A04FC94B}">
-              <ma14:wrappingTextBoxFlag xmlns="" xmlns:ma14="http://schemas.microsoft.com/office/mac/drawingml/2011/main" val="1"/>
+              <ma14:wrappingTextBoxFlag xmlns:ma14="http://schemas.microsoft.com/office/mac/drawingml/2011/main" xmlns="" val="1"/>
             </a:ext>
           </a:extLst>
         </p:spPr>
@@ -5947,7 +5960,7 @@
           </a:ln>
           <a:extLst>
             <a:ext uri="{C572A759-6A51-4108-AA02-DFA0A04FC94B}">
-              <ma14:wrappingTextBoxFlag xmlns="" xmlns:ma14="http://schemas.microsoft.com/office/mac/drawingml/2011/main" val="1"/>
+              <ma14:wrappingTextBoxFlag xmlns:ma14="http://schemas.microsoft.com/office/mac/drawingml/2011/main" xmlns="" val="1"/>
             </a:ext>
           </a:extLst>
         </p:spPr>
@@ -6246,7 +6259,7 @@
           </a:ln>
           <a:extLst>
             <a:ext uri="{C572A759-6A51-4108-AA02-DFA0A04FC94B}">
-              <ma14:wrappingTextBoxFlag xmlns="" xmlns:ma14="http://schemas.microsoft.com/office/mac/drawingml/2011/main" val="1"/>
+              <ma14:wrappingTextBoxFlag xmlns:ma14="http://schemas.microsoft.com/office/mac/drawingml/2011/main" xmlns="" val="1"/>
             </a:ext>
           </a:extLst>
         </p:spPr>
@@ -6649,7 +6662,7 @@
           </a:ln>
           <a:extLst>
             <a:ext uri="{C572A759-6A51-4108-AA02-DFA0A04FC94B}">
-              <ma14:wrappingTextBoxFlag xmlns="" xmlns:ma14="http://schemas.microsoft.com/office/mac/drawingml/2011/main" val="1"/>
+              <ma14:wrappingTextBoxFlag xmlns:ma14="http://schemas.microsoft.com/office/mac/drawingml/2011/main" xmlns="" val="1"/>
             </a:ext>
           </a:extLst>
         </p:spPr>
@@ -6812,7 +6825,7 @@
                   <a:srgbClr val="000000"/>
                 </a:solidFill>
               </a:rPr>
-              <a:t>ds.set_missing</a:t>
+              <a:t>ds.as_missing</a:t>
             </a:r>
             <a:r>
               <a:rPr lang="en-GB" sz="1400" b="1" dirty="0" smtClean="0">
@@ -7060,7 +7073,7 @@
           </a:ln>
           <a:extLst>
             <a:ext uri="{C572A759-6A51-4108-AA02-DFA0A04FC94B}">
-              <ma14:wrappingTextBoxFlag xmlns="" xmlns:ma14="http://schemas.microsoft.com/office/mac/drawingml/2011/main" val="1"/>
+              <ma14:wrappingTextBoxFlag xmlns:ma14="http://schemas.microsoft.com/office/mac/drawingml/2011/main" xmlns="" val="1"/>
             </a:ext>
           </a:extLst>
         </p:spPr>
@@ -7427,7 +7440,7 @@
           </a:ln>
           <a:extLst>
             <a:ext uri="{C572A759-6A51-4108-AA02-DFA0A04FC94B}">
-              <ma14:wrappingTextBoxFlag xmlns="" xmlns:ma14="http://schemas.microsoft.com/office/mac/drawingml/2011/main" val="1"/>
+              <ma14:wrappingTextBoxFlag xmlns:ma14="http://schemas.microsoft.com/office/mac/drawingml/2011/main" xmlns="" val="1"/>
             </a:ext>
           </a:extLst>
         </p:spPr>
@@ -7855,7 +7868,7 @@
           </a:ln>
           <a:extLst>
             <a:ext uri="{C572A759-6A51-4108-AA02-DFA0A04FC94B}">
-              <ma14:wrappingTextBoxFlag xmlns="" xmlns:ma14="http://schemas.microsoft.com/office/mac/drawingml/2011/main" val="1"/>
+              <ma14:wrappingTextBoxFlag xmlns:ma14="http://schemas.microsoft.com/office/mac/drawingml/2011/main" xmlns="" val="1"/>
             </a:ext>
           </a:extLst>
         </p:spPr>
@@ -8334,7 +8347,7 @@
           </a:ln>
           <a:extLst>
             <a:ext uri="{C572A759-6A51-4108-AA02-DFA0A04FC94B}">
-              <ma14:wrappingTextBoxFlag xmlns="" xmlns:ma14="http://schemas.microsoft.com/office/mac/drawingml/2011/main" val="1"/>
+              <ma14:wrappingTextBoxFlag xmlns:ma14="http://schemas.microsoft.com/office/mac/drawingml/2011/main" xmlns="" val="1"/>
             </a:ext>
           </a:extLst>
         </p:spPr>
@@ -8818,15 +8831,7 @@
                   <a:srgbClr val="000000"/>
                 </a:solidFill>
               </a:rPr>
-              <a:t>(2</a:t>
-            </a:r>
-            <a:r>
-              <a:rPr lang="en-GB" sz="1400" b="1" dirty="0" smtClean="0">
-                <a:solidFill>
-                  <a:srgbClr val="000000"/>
-                </a:solidFill>
-              </a:rPr>
-              <a:t>)</a:t>
+              <a:t>(2)</a:t>
             </a:r>
           </a:p>
           <a:p>

</xml_diff>

<commit_message>
update version number in cheat sheets
</commit_message>
<xml_diff>
--- a/cheatsheet/nctoolkit_cheatsheet.pptx
+++ b/cheatsheet/nctoolkit_cheatsheet.pptx
@@ -109,7 +109,7 @@
 <file path=ppt/revisionInfo.xml><?xml version="1.0" encoding="utf-8"?>
 <p1510:revInfo xmlns:a="http://schemas.openxmlformats.org/drawingml/2006/main" xmlns:r="http://schemas.openxmlformats.org/officeDocument/2006/relationships" xmlns:p1510="http://schemas.microsoft.com/office/powerpoint/2015/10/main">
   <p1510:revLst>
-    <p1510:client id="{A46308C0-0EDE-7830-9F5A-22B792374B3D}" v="155" dt="2023-06-09T08:11:34.513"/>
+    <p1510:client id="{DB563568-CF79-5090-381E-811D5F6EB550}" v="5" dt="2024-02-06T11:10:46.504"/>
   </p1510:revLst>
 </p1510:revInfo>
 </file>
@@ -1451,7 +1451,7 @@
           </a:ln>
           <a:extLst>
             <a:ext uri="{C572A759-6A51-4108-AA02-DFA0A04FC94B}">
-              <ma14:wrappingTextBoxFlag xmlns="" xmlns:ma14="http://schemas.microsoft.com/office/mac/drawingml/2011/main" val="1"/>
+              <ma14:wrappingTextBoxFlag xmlns:ma14="http://schemas.microsoft.com/office/mac/drawingml/2011/main" xmlns="" val="1"/>
             </a:ext>
           </a:extLst>
         </p:spPr>
@@ -1494,7 +1494,7 @@
           </a:ln>
           <a:extLst>
             <a:ext uri="{C572A759-6A51-4108-AA02-DFA0A04FC94B}">
-              <ma14:wrappingTextBoxFlag xmlns="" xmlns:ma14="http://schemas.microsoft.com/office/mac/drawingml/2011/main" val="1"/>
+              <ma14:wrappingTextBoxFlag xmlns:ma14="http://schemas.microsoft.com/office/mac/drawingml/2011/main" xmlns="" val="1"/>
             </a:ext>
           </a:extLst>
         </p:spPr>
@@ -1933,7 +1933,7 @@
                 <a:cs typeface="Source Sans Pro Semibold"/>
                 <a:sym typeface="Source Sans Pro"/>
               </a:rPr>
-              <a:t> v0.9.3</a:t>
+              <a:t> v1.1.6</a:t>
             </a:r>
             <a:endParaRPr sz="2000" dirty="0">
               <a:solidFill>
@@ -1989,7 +1989,7 @@
           </a:ln>
           <a:extLst>
             <a:ext uri="{C572A759-6A51-4108-AA02-DFA0A04FC94B}">
-              <ma14:wrappingTextBoxFlag xmlns="" xmlns:ma14="http://schemas.microsoft.com/office/mac/drawingml/2011/main" val="1"/>
+              <ma14:wrappingTextBoxFlag xmlns:ma14="http://schemas.microsoft.com/office/mac/drawingml/2011/main" xmlns="" val="1"/>
             </a:ext>
           </a:extLst>
         </p:spPr>
@@ -2319,7 +2319,7 @@
           </a:ln>
           <a:extLst>
             <a:ext uri="{C572A759-6A51-4108-AA02-DFA0A04FC94B}">
-              <ma14:wrappingTextBoxFlag xmlns="" xmlns:ma14="http://schemas.microsoft.com/office/mac/drawingml/2011/main" val="1"/>
+              <ma14:wrappingTextBoxFlag xmlns:ma14="http://schemas.microsoft.com/office/mac/drawingml/2011/main" xmlns="" val="1"/>
             </a:ext>
           </a:extLst>
         </p:spPr>
@@ -2847,7 +2847,7 @@
           </a:ln>
           <a:extLst>
             <a:ext uri="{C572A759-6A51-4108-AA02-DFA0A04FC94B}">
-              <ma14:wrappingTextBoxFlag xmlns="" xmlns:ma14="http://schemas.microsoft.com/office/mac/drawingml/2011/main" val="1"/>
+              <ma14:wrappingTextBoxFlag xmlns:ma14="http://schemas.microsoft.com/office/mac/drawingml/2011/main" xmlns="" val="1"/>
             </a:ext>
           </a:extLst>
         </p:spPr>
@@ -3095,7 +3095,7 @@
           </a:ln>
           <a:extLst>
             <a:ext uri="{C572A759-6A51-4108-AA02-DFA0A04FC94B}">
-              <ma14:wrappingTextBoxFlag xmlns="" xmlns:ma14="http://schemas.microsoft.com/office/mac/drawingml/2011/main" val="1"/>
+              <ma14:wrappingTextBoxFlag xmlns:ma14="http://schemas.microsoft.com/office/mac/drawingml/2011/main" xmlns="" val="1"/>
             </a:ext>
           </a:extLst>
         </p:spPr>
@@ -3152,7 +3152,7 @@
           </a:ln>
           <a:extLst>
             <a:ext uri="{C572A759-6A51-4108-AA02-DFA0A04FC94B}">
-              <ma14:wrappingTextBoxFlag xmlns="" xmlns:ma14="http://schemas.microsoft.com/office/mac/drawingml/2011/main" val="1"/>
+              <ma14:wrappingTextBoxFlag xmlns:ma14="http://schemas.microsoft.com/office/mac/drawingml/2011/main" xmlns="" val="1"/>
             </a:ext>
           </a:extLst>
         </p:spPr>
@@ -4029,7 +4029,7 @@
           </a:ln>
           <a:extLst>
             <a:ext uri="{C572A759-6A51-4108-AA02-DFA0A04FC94B}">
-              <ma14:wrappingTextBoxFlag xmlns="" xmlns:ma14="http://schemas.microsoft.com/office/mac/drawingml/2011/main" val="1"/>
+              <ma14:wrappingTextBoxFlag xmlns:ma14="http://schemas.microsoft.com/office/mac/drawingml/2011/main" xmlns="" val="1"/>
             </a:ext>
           </a:extLst>
         </p:spPr>
@@ -4386,7 +4386,7 @@
           </a:ln>
           <a:extLst>
             <a:ext uri="{C572A759-6A51-4108-AA02-DFA0A04FC94B}">
-              <ma14:wrappingTextBoxFlag xmlns="" xmlns:ma14="http://schemas.microsoft.com/office/mac/drawingml/2011/main" val="1"/>
+              <ma14:wrappingTextBoxFlag xmlns:ma14="http://schemas.microsoft.com/office/mac/drawingml/2011/main" xmlns="" val="1"/>
             </a:ext>
           </a:extLst>
         </p:spPr>
@@ -4739,7 +4739,7 @@
           </a:ln>
           <a:extLst>
             <a:ext uri="{C572A759-6A51-4108-AA02-DFA0A04FC94B}">
-              <ma14:wrappingTextBoxFlag xmlns="" xmlns:ma14="http://schemas.microsoft.com/office/mac/drawingml/2011/main" val="1"/>
+              <ma14:wrappingTextBoxFlag xmlns:ma14="http://schemas.microsoft.com/office/mac/drawingml/2011/main" xmlns="" val="1"/>
             </a:ext>
           </a:extLst>
         </p:spPr>
@@ -4913,7 +4913,7 @@
           </a:ln>
           <a:extLst>
             <a:ext uri="{C572A759-6A51-4108-AA02-DFA0A04FC94B}">
-              <ma14:wrappingTextBoxFlag xmlns="" xmlns:ma14="http://schemas.microsoft.com/office/mac/drawingml/2011/main" val="1"/>
+              <ma14:wrappingTextBoxFlag xmlns:ma14="http://schemas.microsoft.com/office/mac/drawingml/2011/main" xmlns="" val="1"/>
             </a:ext>
           </a:extLst>
         </p:spPr>
@@ -5057,7 +5057,7 @@
           </a:ln>
           <a:extLst>
             <a:ext uri="{C572A759-6A51-4108-AA02-DFA0A04FC94B}">
-              <ma14:wrappingTextBoxFlag xmlns="" xmlns:ma14="http://schemas.microsoft.com/office/mac/drawingml/2011/main" val="1"/>
+              <ma14:wrappingTextBoxFlag xmlns:ma14="http://schemas.microsoft.com/office/mac/drawingml/2011/main" xmlns="" val="1"/>
             </a:ext>
           </a:extLst>
         </p:spPr>
@@ -5403,7 +5403,7 @@
           </a:ln>
           <a:extLst>
             <a:ext uri="{C572A759-6A51-4108-AA02-DFA0A04FC94B}">
-              <ma14:wrappingTextBoxFlag xmlns="" xmlns:ma14="http://schemas.microsoft.com/office/mac/drawingml/2011/main" val="1"/>
+              <ma14:wrappingTextBoxFlag xmlns:ma14="http://schemas.microsoft.com/office/mac/drawingml/2011/main" xmlns="" val="1"/>
             </a:ext>
           </a:extLst>
         </p:spPr>
@@ -5689,7 +5689,7 @@
           </a:ln>
           <a:extLst>
             <a:ext uri="{C572A759-6A51-4108-AA02-DFA0A04FC94B}">
-              <ma14:wrappingTextBoxFlag xmlns="" xmlns:ma14="http://schemas.microsoft.com/office/mac/drawingml/2011/main" val="1"/>
+              <ma14:wrappingTextBoxFlag xmlns:ma14="http://schemas.microsoft.com/office/mac/drawingml/2011/main" xmlns="" val="1"/>
             </a:ext>
           </a:extLst>
         </p:spPr>
@@ -6027,7 +6027,7 @@
           </a:ln>
           <a:extLst>
             <a:ext uri="{C572A759-6A51-4108-AA02-DFA0A04FC94B}">
-              <ma14:wrappingTextBoxFlag xmlns="" xmlns:ma14="http://schemas.microsoft.com/office/mac/drawingml/2011/main" val="1"/>
+              <ma14:wrappingTextBoxFlag xmlns:ma14="http://schemas.microsoft.com/office/mac/drawingml/2011/main" xmlns="" val="1"/>
             </a:ext>
           </a:extLst>
         </p:spPr>
@@ -6368,7 +6368,7 @@
           </a:ln>
           <a:extLst>
             <a:ext uri="{C572A759-6A51-4108-AA02-DFA0A04FC94B}">
-              <ma14:wrappingTextBoxFlag xmlns="" xmlns:ma14="http://schemas.microsoft.com/office/mac/drawingml/2011/main" val="1"/>
+              <ma14:wrappingTextBoxFlag xmlns:ma14="http://schemas.microsoft.com/office/mac/drawingml/2011/main" xmlns="" val="1"/>
             </a:ext>
           </a:extLst>
         </p:spPr>
@@ -6683,7 +6683,7 @@
           </a:ln>
           <a:extLst>
             <a:ext uri="{C572A759-6A51-4108-AA02-DFA0A04FC94B}">
-              <ma14:wrappingTextBoxFlag xmlns="" xmlns:ma14="http://schemas.microsoft.com/office/mac/drawingml/2011/main" val="1"/>
+              <ma14:wrappingTextBoxFlag xmlns:ma14="http://schemas.microsoft.com/office/mac/drawingml/2011/main" xmlns="" val="1"/>
             </a:ext>
           </a:extLst>
         </p:spPr>
@@ -7040,7 +7040,7 @@
           </a:ln>
           <a:extLst>
             <a:ext uri="{C572A759-6A51-4108-AA02-DFA0A04FC94B}">
-              <ma14:wrappingTextBoxFlag xmlns="" xmlns:ma14="http://schemas.microsoft.com/office/mac/drawingml/2011/main" val="1"/>
+              <ma14:wrappingTextBoxFlag xmlns:ma14="http://schemas.microsoft.com/office/mac/drawingml/2011/main" xmlns="" val="1"/>
             </a:ext>
           </a:extLst>
         </p:spPr>
@@ -7299,7 +7299,7 @@
           </a:ln>
           <a:extLst>
             <a:ext uri="{C572A759-6A51-4108-AA02-DFA0A04FC94B}">
-              <ma14:wrappingTextBoxFlag xmlns="" xmlns:ma14="http://schemas.microsoft.com/office/mac/drawingml/2011/main" val="1"/>
+              <ma14:wrappingTextBoxFlag xmlns:ma14="http://schemas.microsoft.com/office/mac/drawingml/2011/main" xmlns="" val="1"/>
             </a:ext>
           </a:extLst>
         </p:spPr>

</xml_diff>

<commit_message>
bump  version number in cheatsheets
</commit_message>
<xml_diff>
--- a/cheatsheet/nctoolkit_cheatsheet.pptx
+++ b/cheatsheet/nctoolkit_cheatsheet.pptx
@@ -109,7 +109,7 @@
 <file path=ppt/revisionInfo.xml><?xml version="1.0" encoding="utf-8"?>
 <p1510:revInfo xmlns:a="http://schemas.openxmlformats.org/drawingml/2006/main" xmlns:r="http://schemas.openxmlformats.org/officeDocument/2006/relationships" xmlns:p1510="http://schemas.microsoft.com/office/powerpoint/2015/10/main">
   <p1510:revLst>
-    <p1510:client id="{DB563568-CF79-5090-381E-811D5F6EB550}" v="5" dt="2024-02-06T11:10:46.504"/>
+    <p1510:client id="{E59E2F4F-BB86-22AB-8807-C99EFC6E1C46}" v="3" dt="2024-06-17T08:20:46.077"/>
   </p1510:revLst>
 </p1510:revInfo>
 </file>
@@ -1933,7 +1933,7 @@
                 <a:cs typeface="Source Sans Pro Semibold"/>
                 <a:sym typeface="Source Sans Pro"/>
               </a:rPr>
-              <a:t> v1.1.6</a:t>
+              <a:t> v1.1.11</a:t>
             </a:r>
             <a:endParaRPr sz="2000" dirty="0">
               <a:solidFill>
@@ -3016,23 +3016,7 @@
                   <a:srgbClr val="000000"/>
                 </a:solidFill>
               </a:rPr>
-              <a:t>(‘</a:t>
-            </a:r>
-            <a:r>
-              <a:rPr lang="en-GB" sz="1400" b="1" dirty="0" err="1">
-                <a:solidFill>
-                  <a:srgbClr val="000000"/>
-                </a:solidFill>
-              </a:rPr>
-              <a:t>var</a:t>
-            </a:r>
-            <a:r>
-              <a:rPr lang="en-GB" sz="1400" b="1" dirty="0">
-                <a:solidFill>
-                  <a:srgbClr val="000000"/>
-                </a:solidFill>
-              </a:rPr>
-              <a:t>’)</a:t>
+              <a:t>(‘var’)</a:t>
             </a:r>
           </a:p>
           <a:p>
@@ -4868,23 +4852,7 @@
                   <a:srgbClr val="000000"/>
                 </a:solidFill>
               </a:rPr>
-              <a:t>	Merge dataset of files with different </a:t>
-            </a:r>
-            <a:r>
-              <a:rPr lang="en-GB" sz="1400" dirty="0" err="1">
-                <a:solidFill>
-                  <a:srgbClr val="000000"/>
-                </a:solidFill>
-              </a:rPr>
-              <a:t>timesteps</a:t>
-            </a:r>
-            <a:r>
-              <a:rPr lang="en-GB" sz="1400" dirty="0">
-                <a:solidFill>
-                  <a:srgbClr val="000000"/>
-                </a:solidFill>
-              </a:rPr>
-              <a:t>.</a:t>
+              <a:t>	Merge dataset of files with different timesteps.</a:t>
             </a:r>
           </a:p>
         </p:txBody>

</xml_diff>